<commit_message>
Update v0.1  - set Framework Init Structure
</commit_message>
<xml_diff>
--- a/doc/Drawing.pptx
+++ b/doc/Drawing.pptx
@@ -6,6 +6,7 @@
   </p:sldMasterIdLst>
   <p:sldIdLst>
     <p:sldId id="256" r:id="rId2"/>
+    <p:sldId id="257" r:id="rId3"/>
   </p:sldIdLst>
   <p:sldSz cx="12192000" cy="6858000"/>
   <p:notesSz cx="6858000" cy="9144000"/>
@@ -104,6 +105,11 @@
       </a:defRPr>
     </a:lvl9pPr>
   </p:defaultTextStyle>
+  <p:extLst>
+    <p:ext uri="{EFAFB233-063F-42B5-8137-9DF3F51BA10A}">
+      <p15:sldGuideLst xmlns:p15="http://schemas.microsoft.com/office/powerpoint/2012/main"/>
+    </p:ext>
+  </p:extLst>
 </p:presentation>
 </file>
 
@@ -238,7 +244,7 @@
           <a:p>
             <a:fld id="{14791B31-ED0F-45ED-8CEE-32F17252434A}" type="datetimeFigureOut">
               <a:rPr lang="en-US" smtClean="0"/>
-              <a:t>2/4/2015</a:t>
+              <a:t>3/16/2015</a:t>
             </a:fld>
             <a:endParaRPr lang="en-US"/>
           </a:p>
@@ -408,7 +414,7 @@
           <a:p>
             <a:fld id="{14791B31-ED0F-45ED-8CEE-32F17252434A}" type="datetimeFigureOut">
               <a:rPr lang="en-US" smtClean="0"/>
-              <a:t>2/4/2015</a:t>
+              <a:t>3/16/2015</a:t>
             </a:fld>
             <a:endParaRPr lang="en-US"/>
           </a:p>
@@ -588,7 +594,7 @@
           <a:p>
             <a:fld id="{14791B31-ED0F-45ED-8CEE-32F17252434A}" type="datetimeFigureOut">
               <a:rPr lang="en-US" smtClean="0"/>
-              <a:t>2/4/2015</a:t>
+              <a:t>3/16/2015</a:t>
             </a:fld>
             <a:endParaRPr lang="en-US"/>
           </a:p>
@@ -758,7 +764,7 @@
           <a:p>
             <a:fld id="{14791B31-ED0F-45ED-8CEE-32F17252434A}" type="datetimeFigureOut">
               <a:rPr lang="en-US" smtClean="0"/>
-              <a:t>2/4/2015</a:t>
+              <a:t>3/16/2015</a:t>
             </a:fld>
             <a:endParaRPr lang="en-US"/>
           </a:p>
@@ -1004,7 +1010,7 @@
           <a:p>
             <a:fld id="{14791B31-ED0F-45ED-8CEE-32F17252434A}" type="datetimeFigureOut">
               <a:rPr lang="en-US" smtClean="0"/>
-              <a:t>2/4/2015</a:t>
+              <a:t>3/16/2015</a:t>
             </a:fld>
             <a:endParaRPr lang="en-US"/>
           </a:p>
@@ -1236,7 +1242,7 @@
           <a:p>
             <a:fld id="{14791B31-ED0F-45ED-8CEE-32F17252434A}" type="datetimeFigureOut">
               <a:rPr lang="en-US" smtClean="0"/>
-              <a:t>2/4/2015</a:t>
+              <a:t>3/16/2015</a:t>
             </a:fld>
             <a:endParaRPr lang="en-US"/>
           </a:p>
@@ -1603,7 +1609,7 @@
           <a:p>
             <a:fld id="{14791B31-ED0F-45ED-8CEE-32F17252434A}" type="datetimeFigureOut">
               <a:rPr lang="en-US" smtClean="0"/>
-              <a:t>2/4/2015</a:t>
+              <a:t>3/16/2015</a:t>
             </a:fld>
             <a:endParaRPr lang="en-US"/>
           </a:p>
@@ -1721,7 +1727,7 @@
           <a:p>
             <a:fld id="{14791B31-ED0F-45ED-8CEE-32F17252434A}" type="datetimeFigureOut">
               <a:rPr lang="en-US" smtClean="0"/>
-              <a:t>2/4/2015</a:t>
+              <a:t>3/16/2015</a:t>
             </a:fld>
             <a:endParaRPr lang="en-US"/>
           </a:p>
@@ -1816,7 +1822,7 @@
           <a:p>
             <a:fld id="{14791B31-ED0F-45ED-8CEE-32F17252434A}" type="datetimeFigureOut">
               <a:rPr lang="en-US" smtClean="0"/>
-              <a:t>2/4/2015</a:t>
+              <a:t>3/16/2015</a:t>
             </a:fld>
             <a:endParaRPr lang="en-US"/>
           </a:p>
@@ -2093,7 +2099,7 @@
           <a:p>
             <a:fld id="{14791B31-ED0F-45ED-8CEE-32F17252434A}" type="datetimeFigureOut">
               <a:rPr lang="en-US" smtClean="0"/>
-              <a:t>2/4/2015</a:t>
+              <a:t>3/16/2015</a:t>
             </a:fld>
             <a:endParaRPr lang="en-US"/>
           </a:p>
@@ -2346,7 +2352,7 @@
           <a:p>
             <a:fld id="{14791B31-ED0F-45ED-8CEE-32F17252434A}" type="datetimeFigureOut">
               <a:rPr lang="en-US" smtClean="0"/>
-              <a:t>2/4/2015</a:t>
+              <a:t>3/16/2015</a:t>
             </a:fld>
             <a:endParaRPr lang="en-US"/>
           </a:p>
@@ -2559,7 +2565,7 @@
           <a:p>
             <a:fld id="{14791B31-ED0F-45ED-8CEE-32F17252434A}" type="datetimeFigureOut">
               <a:rPr lang="en-US" smtClean="0"/>
-              <a:t>2/4/2015</a:t>
+              <a:t>3/16/2015</a:t>
             </a:fld>
             <a:endParaRPr lang="en-US"/>
           </a:p>
@@ -3009,12 +3015,47 @@
           <a:p>
             <a:pPr algn="ctr"/>
             <a:r>
+              <a:rPr lang="en-US" b="1" u="sng" dirty="0" smtClean="0">
+                <a:solidFill>
+                  <a:sysClr val="windowText" lastClr="000000"/>
+                </a:solidFill>
+              </a:rPr>
+              <a:t>Device</a:t>
+            </a:r>
+            <a:r>
               <a:rPr lang="en-US" dirty="0" smtClean="0">
                 <a:solidFill>
                   <a:sysClr val="windowText" lastClr="000000"/>
                 </a:solidFill>
               </a:rPr>
-              <a:t>SNSDK Framework</a:t>
+              <a:t> class</a:t>
+            </a:r>
+          </a:p>
+          <a:p>
+            <a:pPr algn="ctr"/>
+            <a:r>
+              <a:rPr lang="en-US" dirty="0" smtClean="0">
+                <a:solidFill>
+                  <a:sysClr val="windowText" lastClr="000000"/>
+                </a:solidFill>
+              </a:rPr>
+              <a:t>In </a:t>
+            </a:r>
+            <a:r>
+              <a:rPr lang="en-US" dirty="0" smtClean="0">
+                <a:solidFill>
+                  <a:sysClr val="windowText" lastClr="000000"/>
+                </a:solidFill>
+              </a:rPr>
+              <a:t>SNSDK </a:t>
+            </a:r>
+            <a:r>
+              <a:rPr lang="en-US" dirty="0" smtClean="0">
+                <a:solidFill>
+                  <a:sysClr val="windowText" lastClr="000000"/>
+                </a:solidFill>
+              </a:rPr>
+              <a:t>Framework</a:t>
             </a:r>
             <a:endParaRPr lang="en-US" dirty="0">
               <a:solidFill>
@@ -3832,6 +3873,1355 @@
     <p:extLst>
       <p:ext uri="{BB962C8B-B14F-4D97-AF65-F5344CB8AC3E}">
         <p14:creationId xmlns:p14="http://schemas.microsoft.com/office/powerpoint/2010/main" val="2479876720"/>
+      </p:ext>
+    </p:extLst>
+  </p:cSld>
+  <p:clrMapOvr>
+    <a:masterClrMapping/>
+  </p:clrMapOvr>
+</p:sld>
+</file>
+
+<file path=ppt/slides/slide2.xml><?xml version="1.0" encoding="utf-8"?>
+<p:sld xmlns:a="http://schemas.openxmlformats.org/drawingml/2006/main" xmlns:r="http://schemas.openxmlformats.org/officeDocument/2006/relationships" xmlns:p="http://schemas.openxmlformats.org/presentationml/2006/main">
+  <p:cSld>
+    <p:spTree>
+      <p:nvGrpSpPr>
+        <p:cNvPr id="1" name=""/>
+        <p:cNvGrpSpPr/>
+        <p:nvPr/>
+      </p:nvGrpSpPr>
+      <p:grpSpPr>
+        <a:xfrm>
+          <a:off x="0" y="0"/>
+          <a:ext cx="0" cy="0"/>
+          <a:chOff x="0" y="0"/>
+          <a:chExt cx="0" cy="0"/>
+        </a:xfrm>
+      </p:grpSpPr>
+      <p:sp>
+        <p:nvSpPr>
+          <p:cNvPr id="65" name="Rectangle 64"/>
+          <p:cNvSpPr/>
+          <p:nvPr/>
+        </p:nvSpPr>
+        <p:spPr>
+          <a:xfrm>
+            <a:off x="1891672" y="3589562"/>
+            <a:ext cx="6914578" cy="1773270"/>
+          </a:xfrm>
+          <a:prstGeom prst="rect">
+            <a:avLst/>
+          </a:prstGeom>
+          <a:solidFill>
+            <a:schemeClr val="bg1">
+              <a:lumMod val="85000"/>
+            </a:schemeClr>
+          </a:solidFill>
+          <a:ln>
+            <a:solidFill>
+              <a:schemeClr val="tx1"/>
+            </a:solidFill>
+          </a:ln>
+        </p:spPr>
+        <p:style>
+          <a:lnRef idx="2">
+            <a:schemeClr val="accent1">
+              <a:shade val="50000"/>
+            </a:schemeClr>
+          </a:lnRef>
+          <a:fillRef idx="1">
+            <a:schemeClr val="accent1"/>
+          </a:fillRef>
+          <a:effectRef idx="0">
+            <a:schemeClr val="accent1"/>
+          </a:effectRef>
+          <a:fontRef idx="minor">
+            <a:schemeClr val="lt1"/>
+          </a:fontRef>
+        </p:style>
+        <p:txBody>
+          <a:bodyPr rtlCol="0" anchor="ctr"/>
+          <a:lstStyle/>
+          <a:p>
+            <a:pPr algn="ctr"/>
+            <a:endParaRPr lang="en-US" dirty="0" smtClean="0">
+              <a:solidFill>
+                <a:sysClr val="windowText" lastClr="000000"/>
+              </a:solidFill>
+            </a:endParaRPr>
+          </a:p>
+        </p:txBody>
+      </p:sp>
+      <p:sp>
+        <p:nvSpPr>
+          <p:cNvPr id="17" name="Rectangle 16"/>
+          <p:cNvSpPr/>
+          <p:nvPr/>
+        </p:nvSpPr>
+        <p:spPr>
+          <a:xfrm>
+            <a:off x="2351903" y="4024180"/>
+            <a:ext cx="1871724" cy="810869"/>
+          </a:xfrm>
+          <a:prstGeom prst="rect">
+            <a:avLst/>
+          </a:prstGeom>
+          <a:solidFill>
+            <a:schemeClr val="bg1"/>
+          </a:solidFill>
+          <a:ln>
+            <a:solidFill>
+              <a:schemeClr val="tx1"/>
+            </a:solidFill>
+          </a:ln>
+        </p:spPr>
+        <p:style>
+          <a:lnRef idx="2">
+            <a:schemeClr val="accent1">
+              <a:shade val="50000"/>
+            </a:schemeClr>
+          </a:lnRef>
+          <a:fillRef idx="1">
+            <a:schemeClr val="accent1"/>
+          </a:fillRef>
+          <a:effectRef idx="0">
+            <a:schemeClr val="accent1"/>
+          </a:effectRef>
+          <a:fontRef idx="minor">
+            <a:schemeClr val="lt1"/>
+          </a:fontRef>
+        </p:style>
+        <p:txBody>
+          <a:bodyPr rtlCol="0" anchor="ctr"/>
+          <a:lstStyle/>
+          <a:p>
+            <a:pPr algn="ctr"/>
+            <a:r>
+              <a:rPr lang="en-US" dirty="0" smtClean="0">
+                <a:solidFill>
+                  <a:sysClr val="windowText" lastClr="000000"/>
+                </a:solidFill>
+              </a:rPr>
+              <a:t>Device Driver</a:t>
+            </a:r>
+            <a:endParaRPr lang="en-US" dirty="0">
+              <a:solidFill>
+                <a:sysClr val="windowText" lastClr="000000"/>
+              </a:solidFill>
+            </a:endParaRPr>
+          </a:p>
+        </p:txBody>
+      </p:sp>
+      <p:sp>
+        <p:nvSpPr>
+          <p:cNvPr id="4" name="Rectangle 3"/>
+          <p:cNvSpPr/>
+          <p:nvPr/>
+        </p:nvSpPr>
+        <p:spPr>
+          <a:xfrm>
+            <a:off x="2332219" y="3651420"/>
+            <a:ext cx="1267716" cy="563725"/>
+          </a:xfrm>
+          <a:prstGeom prst="rect">
+            <a:avLst/>
+          </a:prstGeom>
+          <a:solidFill>
+            <a:schemeClr val="bg1"/>
+          </a:solidFill>
+          <a:ln>
+            <a:solidFill>
+              <a:schemeClr val="tx1"/>
+            </a:solidFill>
+          </a:ln>
+        </p:spPr>
+        <p:style>
+          <a:lnRef idx="2">
+            <a:schemeClr val="accent1">
+              <a:shade val="50000"/>
+            </a:schemeClr>
+          </a:lnRef>
+          <a:fillRef idx="1">
+            <a:schemeClr val="accent1"/>
+          </a:fillRef>
+          <a:effectRef idx="0">
+            <a:schemeClr val="accent1"/>
+          </a:effectRef>
+          <a:fontRef idx="minor">
+            <a:schemeClr val="lt1"/>
+          </a:fontRef>
+        </p:style>
+        <p:txBody>
+          <a:bodyPr rtlCol="0" anchor="ctr"/>
+          <a:lstStyle/>
+          <a:p>
+            <a:pPr algn="ctr"/>
+            <a:r>
+              <a:rPr lang="en-US" dirty="0" smtClean="0">
+                <a:solidFill>
+                  <a:sysClr val="windowText" lastClr="000000"/>
+                </a:solidFill>
+              </a:rPr>
+              <a:t>Device</a:t>
+            </a:r>
+            <a:endParaRPr lang="en-US" dirty="0">
+              <a:solidFill>
+                <a:sysClr val="windowText" lastClr="000000"/>
+              </a:solidFill>
+            </a:endParaRPr>
+          </a:p>
+        </p:txBody>
+      </p:sp>
+      <p:sp>
+        <p:nvSpPr>
+          <p:cNvPr id="19" name="Rectangle 18"/>
+          <p:cNvSpPr/>
+          <p:nvPr/>
+        </p:nvSpPr>
+        <p:spPr>
+          <a:xfrm>
+            <a:off x="2283617" y="4073888"/>
+            <a:ext cx="1871724" cy="810869"/>
+          </a:xfrm>
+          <a:prstGeom prst="rect">
+            <a:avLst/>
+          </a:prstGeom>
+          <a:solidFill>
+            <a:schemeClr val="bg1"/>
+          </a:solidFill>
+          <a:ln>
+            <a:solidFill>
+              <a:schemeClr val="tx1"/>
+            </a:solidFill>
+          </a:ln>
+        </p:spPr>
+        <p:style>
+          <a:lnRef idx="2">
+            <a:schemeClr val="accent1">
+              <a:shade val="50000"/>
+            </a:schemeClr>
+          </a:lnRef>
+          <a:fillRef idx="1">
+            <a:schemeClr val="accent1"/>
+          </a:fillRef>
+          <a:effectRef idx="0">
+            <a:schemeClr val="accent1"/>
+          </a:effectRef>
+          <a:fontRef idx="minor">
+            <a:schemeClr val="lt1"/>
+          </a:fontRef>
+        </p:style>
+        <p:txBody>
+          <a:bodyPr rtlCol="0" anchor="ctr"/>
+          <a:lstStyle/>
+          <a:p>
+            <a:pPr algn="ctr"/>
+            <a:r>
+              <a:rPr lang="en-US" dirty="0" smtClean="0">
+                <a:solidFill>
+                  <a:sysClr val="windowText" lastClr="000000"/>
+                </a:solidFill>
+              </a:rPr>
+              <a:t>Device Driver</a:t>
+            </a:r>
+            <a:endParaRPr lang="en-US" dirty="0">
+              <a:solidFill>
+                <a:sysClr val="windowText" lastClr="000000"/>
+              </a:solidFill>
+            </a:endParaRPr>
+          </a:p>
+        </p:txBody>
+      </p:sp>
+      <p:sp>
+        <p:nvSpPr>
+          <p:cNvPr id="20" name="Rectangle 19"/>
+          <p:cNvSpPr/>
+          <p:nvPr/>
+        </p:nvSpPr>
+        <p:spPr>
+          <a:xfrm>
+            <a:off x="2263933" y="3701128"/>
+            <a:ext cx="1267716" cy="563725"/>
+          </a:xfrm>
+          <a:prstGeom prst="rect">
+            <a:avLst/>
+          </a:prstGeom>
+          <a:solidFill>
+            <a:schemeClr val="bg1"/>
+          </a:solidFill>
+          <a:ln>
+            <a:solidFill>
+              <a:schemeClr val="tx1"/>
+            </a:solidFill>
+          </a:ln>
+        </p:spPr>
+        <p:style>
+          <a:lnRef idx="2">
+            <a:schemeClr val="accent1">
+              <a:shade val="50000"/>
+            </a:schemeClr>
+          </a:lnRef>
+          <a:fillRef idx="1">
+            <a:schemeClr val="accent1"/>
+          </a:fillRef>
+          <a:effectRef idx="0">
+            <a:schemeClr val="accent1"/>
+          </a:effectRef>
+          <a:fontRef idx="minor">
+            <a:schemeClr val="lt1"/>
+          </a:fontRef>
+        </p:style>
+        <p:txBody>
+          <a:bodyPr rtlCol="0" anchor="ctr"/>
+          <a:lstStyle/>
+          <a:p>
+            <a:pPr algn="ctr"/>
+            <a:r>
+              <a:rPr lang="en-US" dirty="0" smtClean="0">
+                <a:solidFill>
+                  <a:sysClr val="windowText" lastClr="000000"/>
+                </a:solidFill>
+              </a:rPr>
+              <a:t>Device</a:t>
+            </a:r>
+            <a:endParaRPr lang="en-US" dirty="0">
+              <a:solidFill>
+                <a:sysClr val="windowText" lastClr="000000"/>
+              </a:solidFill>
+            </a:endParaRPr>
+          </a:p>
+        </p:txBody>
+      </p:sp>
+      <p:sp>
+        <p:nvSpPr>
+          <p:cNvPr id="21" name="Rectangle 20"/>
+          <p:cNvSpPr/>
+          <p:nvPr/>
+        </p:nvSpPr>
+        <p:spPr>
+          <a:xfrm>
+            <a:off x="2215331" y="4140072"/>
+            <a:ext cx="1871724" cy="810869"/>
+          </a:xfrm>
+          <a:prstGeom prst="rect">
+            <a:avLst/>
+          </a:prstGeom>
+          <a:solidFill>
+            <a:schemeClr val="bg1"/>
+          </a:solidFill>
+          <a:ln>
+            <a:solidFill>
+              <a:schemeClr val="tx1"/>
+            </a:solidFill>
+          </a:ln>
+        </p:spPr>
+        <p:style>
+          <a:lnRef idx="2">
+            <a:schemeClr val="accent1">
+              <a:shade val="50000"/>
+            </a:schemeClr>
+          </a:lnRef>
+          <a:fillRef idx="1">
+            <a:schemeClr val="accent1"/>
+          </a:fillRef>
+          <a:effectRef idx="0">
+            <a:schemeClr val="accent1"/>
+          </a:effectRef>
+          <a:fontRef idx="minor">
+            <a:schemeClr val="lt1"/>
+          </a:fontRef>
+        </p:style>
+        <p:txBody>
+          <a:bodyPr rtlCol="0" anchor="ctr"/>
+          <a:lstStyle/>
+          <a:p>
+            <a:pPr algn="ctr"/>
+            <a:r>
+              <a:rPr lang="en-US" dirty="0" smtClean="0">
+                <a:solidFill>
+                  <a:sysClr val="windowText" lastClr="000000"/>
+                </a:solidFill>
+              </a:rPr>
+              <a:t>Device Driver</a:t>
+            </a:r>
+            <a:endParaRPr lang="en-US" dirty="0">
+              <a:solidFill>
+                <a:sysClr val="windowText" lastClr="000000"/>
+              </a:solidFill>
+            </a:endParaRPr>
+          </a:p>
+        </p:txBody>
+      </p:sp>
+      <p:sp>
+        <p:nvSpPr>
+          <p:cNvPr id="22" name="Rectangle 21"/>
+          <p:cNvSpPr/>
+          <p:nvPr/>
+        </p:nvSpPr>
+        <p:spPr>
+          <a:xfrm>
+            <a:off x="2195647" y="3767312"/>
+            <a:ext cx="1267716" cy="563725"/>
+          </a:xfrm>
+          <a:prstGeom prst="rect">
+            <a:avLst/>
+          </a:prstGeom>
+          <a:solidFill>
+            <a:schemeClr val="bg2">
+              <a:lumMod val="90000"/>
+            </a:schemeClr>
+          </a:solidFill>
+          <a:ln>
+            <a:solidFill>
+              <a:schemeClr val="tx1"/>
+            </a:solidFill>
+          </a:ln>
+        </p:spPr>
+        <p:style>
+          <a:lnRef idx="2">
+            <a:schemeClr val="accent1">
+              <a:shade val="50000"/>
+            </a:schemeClr>
+          </a:lnRef>
+          <a:fillRef idx="1">
+            <a:schemeClr val="accent1"/>
+          </a:fillRef>
+          <a:effectRef idx="0">
+            <a:schemeClr val="accent1"/>
+          </a:effectRef>
+          <a:fontRef idx="minor">
+            <a:schemeClr val="lt1"/>
+          </a:fontRef>
+        </p:style>
+        <p:txBody>
+          <a:bodyPr rtlCol="0" anchor="ctr"/>
+          <a:lstStyle/>
+          <a:p>
+            <a:pPr algn="ctr"/>
+            <a:r>
+              <a:rPr lang="en-US" dirty="0" smtClean="0">
+                <a:solidFill>
+                  <a:sysClr val="windowText" lastClr="000000"/>
+                </a:solidFill>
+              </a:rPr>
+              <a:t>Device</a:t>
+            </a:r>
+            <a:endParaRPr lang="en-US" dirty="0">
+              <a:solidFill>
+                <a:sysClr val="windowText" lastClr="000000"/>
+              </a:solidFill>
+            </a:endParaRPr>
+          </a:p>
+        </p:txBody>
+      </p:sp>
+      <p:sp>
+        <p:nvSpPr>
+          <p:cNvPr id="23" name="Rectangle 22"/>
+          <p:cNvSpPr/>
+          <p:nvPr/>
+        </p:nvSpPr>
+        <p:spPr>
+          <a:xfrm>
+            <a:off x="1891672" y="1770846"/>
+            <a:ext cx="6914578" cy="1779519"/>
+          </a:xfrm>
+          <a:prstGeom prst="rect">
+            <a:avLst/>
+          </a:prstGeom>
+          <a:solidFill>
+            <a:schemeClr val="bg1">
+              <a:lumMod val="85000"/>
+            </a:schemeClr>
+          </a:solidFill>
+          <a:ln>
+            <a:solidFill>
+              <a:schemeClr val="tx1"/>
+            </a:solidFill>
+          </a:ln>
+        </p:spPr>
+        <p:style>
+          <a:lnRef idx="2">
+            <a:schemeClr val="accent1">
+              <a:shade val="50000"/>
+            </a:schemeClr>
+          </a:lnRef>
+          <a:fillRef idx="1">
+            <a:schemeClr val="accent1"/>
+          </a:fillRef>
+          <a:effectRef idx="0">
+            <a:schemeClr val="accent1"/>
+          </a:effectRef>
+          <a:fontRef idx="minor">
+            <a:schemeClr val="lt1"/>
+          </a:fontRef>
+        </p:style>
+        <p:txBody>
+          <a:bodyPr rtlCol="0" anchor="ctr"/>
+          <a:lstStyle/>
+          <a:p>
+            <a:pPr algn="ctr"/>
+            <a:endParaRPr lang="en-US" dirty="0" smtClean="0">
+              <a:solidFill>
+                <a:sysClr val="windowText" lastClr="000000"/>
+              </a:solidFill>
+            </a:endParaRPr>
+          </a:p>
+        </p:txBody>
+      </p:sp>
+      <p:sp>
+        <p:nvSpPr>
+          <p:cNvPr id="24" name="Rectangle 23"/>
+          <p:cNvSpPr/>
+          <p:nvPr/>
+        </p:nvSpPr>
+        <p:spPr>
+          <a:xfrm>
+            <a:off x="1891672" y="1150941"/>
+            <a:ext cx="6914578" cy="521577"/>
+          </a:xfrm>
+          <a:prstGeom prst="rect">
+            <a:avLst/>
+          </a:prstGeom>
+          <a:solidFill>
+            <a:schemeClr val="bg1">
+              <a:lumMod val="85000"/>
+            </a:schemeClr>
+          </a:solidFill>
+          <a:ln>
+            <a:solidFill>
+              <a:schemeClr val="tx1"/>
+            </a:solidFill>
+          </a:ln>
+        </p:spPr>
+        <p:style>
+          <a:lnRef idx="2">
+            <a:schemeClr val="accent1">
+              <a:shade val="50000"/>
+            </a:schemeClr>
+          </a:lnRef>
+          <a:fillRef idx="1">
+            <a:schemeClr val="accent1"/>
+          </a:fillRef>
+          <a:effectRef idx="0">
+            <a:schemeClr val="accent1"/>
+          </a:effectRef>
+          <a:fontRef idx="minor">
+            <a:schemeClr val="lt1"/>
+          </a:fontRef>
+        </p:style>
+        <p:txBody>
+          <a:bodyPr rtlCol="0" anchor="ctr"/>
+          <a:lstStyle/>
+          <a:p>
+            <a:pPr algn="ctr"/>
+            <a:r>
+              <a:rPr lang="en-US" dirty="0" smtClean="0">
+                <a:solidFill>
+                  <a:sysClr val="windowText" lastClr="000000"/>
+                </a:solidFill>
+              </a:rPr>
+              <a:t>Application Layer</a:t>
+            </a:r>
+            <a:endParaRPr lang="en-US" dirty="0">
+              <a:solidFill>
+                <a:sysClr val="windowText" lastClr="000000"/>
+              </a:solidFill>
+            </a:endParaRPr>
+          </a:p>
+        </p:txBody>
+      </p:sp>
+      <p:sp>
+        <p:nvSpPr>
+          <p:cNvPr id="26" name="Rectangle 25"/>
+          <p:cNvSpPr/>
+          <p:nvPr/>
+        </p:nvSpPr>
+        <p:spPr>
+          <a:xfrm>
+            <a:off x="2215331" y="2777391"/>
+            <a:ext cx="2008296" cy="463378"/>
+          </a:xfrm>
+          <a:prstGeom prst="rect">
+            <a:avLst/>
+          </a:prstGeom>
+          <a:solidFill>
+            <a:schemeClr val="bg1"/>
+          </a:solidFill>
+          <a:ln>
+            <a:solidFill>
+              <a:schemeClr val="tx1"/>
+            </a:solidFill>
+          </a:ln>
+        </p:spPr>
+        <p:style>
+          <a:lnRef idx="2">
+            <a:schemeClr val="accent1">
+              <a:shade val="50000"/>
+            </a:schemeClr>
+          </a:lnRef>
+          <a:fillRef idx="1">
+            <a:schemeClr val="accent1"/>
+          </a:fillRef>
+          <a:effectRef idx="0">
+            <a:schemeClr val="accent1"/>
+          </a:effectRef>
+          <a:fontRef idx="minor">
+            <a:schemeClr val="lt1"/>
+          </a:fontRef>
+        </p:style>
+        <p:txBody>
+          <a:bodyPr rtlCol="0" anchor="ctr"/>
+          <a:lstStyle/>
+          <a:p>
+            <a:pPr algn="ctr"/>
+            <a:r>
+              <a:rPr lang="en-US" sz="1400" dirty="0" smtClean="0">
+                <a:solidFill>
+                  <a:sysClr val="windowText" lastClr="000000"/>
+                </a:solidFill>
+              </a:rPr>
+              <a:t>Device Manager</a:t>
+            </a:r>
+            <a:endParaRPr lang="en-US" sz="1400" dirty="0">
+              <a:solidFill>
+                <a:sysClr val="windowText" lastClr="000000"/>
+              </a:solidFill>
+            </a:endParaRPr>
+          </a:p>
+        </p:txBody>
+      </p:sp>
+      <p:sp>
+        <p:nvSpPr>
+          <p:cNvPr id="27" name="Rectangle 26"/>
+          <p:cNvSpPr/>
+          <p:nvPr/>
+        </p:nvSpPr>
+        <p:spPr>
+          <a:xfrm>
+            <a:off x="4266553" y="2777391"/>
+            <a:ext cx="2008296" cy="463378"/>
+          </a:xfrm>
+          <a:prstGeom prst="rect">
+            <a:avLst/>
+          </a:prstGeom>
+          <a:solidFill>
+            <a:schemeClr val="bg1"/>
+          </a:solidFill>
+          <a:ln>
+            <a:solidFill>
+              <a:schemeClr val="tx1"/>
+            </a:solidFill>
+          </a:ln>
+        </p:spPr>
+        <p:style>
+          <a:lnRef idx="2">
+            <a:schemeClr val="accent1">
+              <a:shade val="50000"/>
+            </a:schemeClr>
+          </a:lnRef>
+          <a:fillRef idx="1">
+            <a:schemeClr val="accent1"/>
+          </a:fillRef>
+          <a:effectRef idx="0">
+            <a:schemeClr val="accent1"/>
+          </a:effectRef>
+          <a:fontRef idx="minor">
+            <a:schemeClr val="lt1"/>
+          </a:fontRef>
+        </p:style>
+        <p:txBody>
+          <a:bodyPr rtlCol="0" anchor="ctr"/>
+          <a:lstStyle/>
+          <a:p>
+            <a:pPr algn="ctr"/>
+            <a:r>
+              <a:rPr lang="en-US" sz="1400" dirty="0">
+                <a:solidFill>
+                  <a:sysClr val="windowText" lastClr="000000"/>
+                </a:solidFill>
+              </a:rPr>
+              <a:t>Protocol Manager</a:t>
+            </a:r>
+            <a:endParaRPr lang="en-US" sz="1400" dirty="0">
+              <a:solidFill>
+                <a:sysClr val="windowText" lastClr="000000"/>
+              </a:solidFill>
+            </a:endParaRPr>
+          </a:p>
+        </p:txBody>
+      </p:sp>
+      <p:sp>
+        <p:nvSpPr>
+          <p:cNvPr id="28" name="Rectangle 27"/>
+          <p:cNvSpPr/>
+          <p:nvPr/>
+        </p:nvSpPr>
+        <p:spPr>
+          <a:xfrm>
+            <a:off x="6317775" y="2777391"/>
+            <a:ext cx="2008296" cy="463378"/>
+          </a:xfrm>
+          <a:prstGeom prst="rect">
+            <a:avLst/>
+          </a:prstGeom>
+          <a:solidFill>
+            <a:schemeClr val="bg1"/>
+          </a:solidFill>
+          <a:ln>
+            <a:solidFill>
+              <a:schemeClr val="tx1"/>
+            </a:solidFill>
+          </a:ln>
+        </p:spPr>
+        <p:style>
+          <a:lnRef idx="2">
+            <a:schemeClr val="accent1">
+              <a:shade val="50000"/>
+            </a:schemeClr>
+          </a:lnRef>
+          <a:fillRef idx="1">
+            <a:schemeClr val="accent1"/>
+          </a:fillRef>
+          <a:effectRef idx="0">
+            <a:schemeClr val="accent1"/>
+          </a:effectRef>
+          <a:fontRef idx="minor">
+            <a:schemeClr val="lt1"/>
+          </a:fontRef>
+        </p:style>
+        <p:txBody>
+          <a:bodyPr rtlCol="0" anchor="ctr"/>
+          <a:lstStyle/>
+          <a:p>
+            <a:pPr algn="ctr"/>
+            <a:r>
+              <a:rPr lang="en-US" sz="1400" dirty="0" smtClean="0">
+                <a:solidFill>
+                  <a:sysClr val="windowText" lastClr="000000"/>
+                </a:solidFill>
+              </a:rPr>
+              <a:t>Network Manager</a:t>
+            </a:r>
+            <a:endParaRPr lang="en-US" sz="1400" dirty="0">
+              <a:solidFill>
+                <a:sysClr val="windowText" lastClr="000000"/>
+              </a:solidFill>
+            </a:endParaRPr>
+          </a:p>
+        </p:txBody>
+      </p:sp>
+      <p:sp>
+        <p:nvSpPr>
+          <p:cNvPr id="34" name="Rectangle 33"/>
+          <p:cNvSpPr/>
+          <p:nvPr/>
+        </p:nvSpPr>
+        <p:spPr>
+          <a:xfrm>
+            <a:off x="2215331" y="2086645"/>
+            <a:ext cx="6110740" cy="463378"/>
+          </a:xfrm>
+          <a:prstGeom prst="rect">
+            <a:avLst/>
+          </a:prstGeom>
+          <a:solidFill>
+            <a:schemeClr val="bg1"/>
+          </a:solidFill>
+          <a:ln>
+            <a:solidFill>
+              <a:schemeClr val="tx1"/>
+            </a:solidFill>
+          </a:ln>
+        </p:spPr>
+        <p:style>
+          <a:lnRef idx="2">
+            <a:schemeClr val="accent1">
+              <a:shade val="50000"/>
+            </a:schemeClr>
+          </a:lnRef>
+          <a:fillRef idx="1">
+            <a:schemeClr val="accent1"/>
+          </a:fillRef>
+          <a:effectRef idx="0">
+            <a:schemeClr val="accent1"/>
+          </a:effectRef>
+          <a:fontRef idx="minor">
+            <a:schemeClr val="lt1"/>
+          </a:fontRef>
+        </p:style>
+        <p:txBody>
+          <a:bodyPr rtlCol="0" anchor="ctr"/>
+          <a:lstStyle/>
+          <a:p>
+            <a:pPr algn="ctr"/>
+            <a:r>
+              <a:rPr lang="en-US" sz="1400" dirty="0" smtClean="0">
+                <a:solidFill>
+                  <a:sysClr val="windowText" lastClr="000000"/>
+                </a:solidFill>
+              </a:rPr>
+              <a:t>System Scheduler</a:t>
+            </a:r>
+            <a:endParaRPr lang="en-US" sz="1400" dirty="0">
+              <a:solidFill>
+                <a:sysClr val="windowText" lastClr="000000"/>
+              </a:solidFill>
+            </a:endParaRPr>
+          </a:p>
+        </p:txBody>
+      </p:sp>
+      <p:sp>
+        <p:nvSpPr>
+          <p:cNvPr id="35" name="Rectangle 34"/>
+          <p:cNvSpPr/>
+          <p:nvPr/>
+        </p:nvSpPr>
+        <p:spPr>
+          <a:xfrm>
+            <a:off x="4266552" y="4024181"/>
+            <a:ext cx="4059519" cy="926760"/>
+          </a:xfrm>
+          <a:prstGeom prst="rect">
+            <a:avLst/>
+          </a:prstGeom>
+          <a:solidFill>
+            <a:schemeClr val="bg1"/>
+          </a:solidFill>
+          <a:ln>
+            <a:solidFill>
+              <a:schemeClr val="tx1"/>
+            </a:solidFill>
+          </a:ln>
+        </p:spPr>
+        <p:style>
+          <a:lnRef idx="2">
+            <a:schemeClr val="accent1">
+              <a:shade val="50000"/>
+            </a:schemeClr>
+          </a:lnRef>
+          <a:fillRef idx="1">
+            <a:schemeClr val="accent1"/>
+          </a:fillRef>
+          <a:effectRef idx="0">
+            <a:schemeClr val="accent1"/>
+          </a:effectRef>
+          <a:fontRef idx="minor">
+            <a:schemeClr val="lt1"/>
+          </a:fontRef>
+        </p:style>
+        <p:txBody>
+          <a:bodyPr rtlCol="0" anchor="ctr"/>
+          <a:lstStyle/>
+          <a:p>
+            <a:pPr algn="ctr"/>
+            <a:r>
+              <a:rPr lang="en-US" dirty="0" smtClean="0">
+                <a:solidFill>
+                  <a:sysClr val="windowText" lastClr="000000"/>
+                </a:solidFill>
+              </a:rPr>
+              <a:t>Network</a:t>
+            </a:r>
+          </a:p>
+        </p:txBody>
+      </p:sp>
+      <p:cxnSp>
+        <p:nvCxnSpPr>
+          <p:cNvPr id="3" name="Straight Arrow Connector 2"/>
+          <p:cNvCxnSpPr/>
+          <p:nvPr/>
+        </p:nvCxnSpPr>
+        <p:spPr>
+          <a:xfrm flipV="1">
+            <a:off x="2603157" y="3240769"/>
+            <a:ext cx="0" cy="410651"/>
+          </a:xfrm>
+          <a:prstGeom prst="straightConnector1">
+            <a:avLst/>
+          </a:prstGeom>
+          <a:ln>
+            <a:solidFill>
+              <a:schemeClr val="tx1"/>
+            </a:solidFill>
+            <a:tailEnd type="triangle"/>
+          </a:ln>
+        </p:spPr>
+        <p:style>
+          <a:lnRef idx="1">
+            <a:schemeClr val="accent1"/>
+          </a:lnRef>
+          <a:fillRef idx="0">
+            <a:schemeClr val="accent1"/>
+          </a:fillRef>
+          <a:effectRef idx="0">
+            <a:schemeClr val="accent1"/>
+          </a:effectRef>
+          <a:fontRef idx="minor">
+            <a:schemeClr val="tx1"/>
+          </a:fontRef>
+        </p:style>
+      </p:cxnSp>
+      <p:cxnSp>
+        <p:nvCxnSpPr>
+          <p:cNvPr id="15" name="Straight Arrow Connector 14"/>
+          <p:cNvCxnSpPr/>
+          <p:nvPr/>
+        </p:nvCxnSpPr>
+        <p:spPr>
+          <a:xfrm>
+            <a:off x="3352800" y="3240769"/>
+            <a:ext cx="0" cy="410651"/>
+          </a:xfrm>
+          <a:prstGeom prst="straightConnector1">
+            <a:avLst/>
+          </a:prstGeom>
+          <a:ln>
+            <a:solidFill>
+              <a:schemeClr val="tx1"/>
+            </a:solidFill>
+            <a:tailEnd type="triangle"/>
+          </a:ln>
+        </p:spPr>
+        <p:style>
+          <a:lnRef idx="1">
+            <a:schemeClr val="accent1"/>
+          </a:lnRef>
+          <a:fillRef idx="0">
+            <a:schemeClr val="accent1"/>
+          </a:fillRef>
+          <a:effectRef idx="0">
+            <a:schemeClr val="accent1"/>
+          </a:effectRef>
+          <a:fontRef idx="minor">
+            <a:schemeClr val="tx1"/>
+          </a:fontRef>
+        </p:style>
+      </p:cxnSp>
+      <p:cxnSp>
+        <p:nvCxnSpPr>
+          <p:cNvPr id="37" name="Straight Arrow Connector 36"/>
+          <p:cNvCxnSpPr/>
+          <p:nvPr/>
+        </p:nvCxnSpPr>
+        <p:spPr>
+          <a:xfrm flipV="1">
+            <a:off x="4637903" y="3240769"/>
+            <a:ext cx="0" cy="783411"/>
+          </a:xfrm>
+          <a:prstGeom prst="straightConnector1">
+            <a:avLst/>
+          </a:prstGeom>
+          <a:ln>
+            <a:solidFill>
+              <a:schemeClr val="tx1"/>
+            </a:solidFill>
+            <a:tailEnd type="triangle"/>
+          </a:ln>
+        </p:spPr>
+        <p:style>
+          <a:lnRef idx="1">
+            <a:schemeClr val="accent1"/>
+          </a:lnRef>
+          <a:fillRef idx="0">
+            <a:schemeClr val="accent1"/>
+          </a:fillRef>
+          <a:effectRef idx="0">
+            <a:schemeClr val="accent1"/>
+          </a:effectRef>
+          <a:fontRef idx="minor">
+            <a:schemeClr val="tx1"/>
+          </a:fontRef>
+        </p:style>
+      </p:cxnSp>
+      <p:cxnSp>
+        <p:nvCxnSpPr>
+          <p:cNvPr id="39" name="Straight Arrow Connector 38"/>
+          <p:cNvCxnSpPr/>
+          <p:nvPr/>
+        </p:nvCxnSpPr>
+        <p:spPr>
+          <a:xfrm>
+            <a:off x="5774724" y="3240769"/>
+            <a:ext cx="0" cy="783411"/>
+          </a:xfrm>
+          <a:prstGeom prst="straightConnector1">
+            <a:avLst/>
+          </a:prstGeom>
+          <a:ln>
+            <a:solidFill>
+              <a:schemeClr val="tx1"/>
+            </a:solidFill>
+            <a:tailEnd type="triangle"/>
+          </a:ln>
+        </p:spPr>
+        <p:style>
+          <a:lnRef idx="1">
+            <a:schemeClr val="accent1"/>
+          </a:lnRef>
+          <a:fillRef idx="0">
+            <a:schemeClr val="accent1"/>
+          </a:fillRef>
+          <a:effectRef idx="0">
+            <a:schemeClr val="accent1"/>
+          </a:effectRef>
+          <a:fontRef idx="minor">
+            <a:schemeClr val="tx1"/>
+          </a:fontRef>
+        </p:style>
+      </p:cxnSp>
+      <p:cxnSp>
+        <p:nvCxnSpPr>
+          <p:cNvPr id="41" name="Straight Arrow Connector 40"/>
+          <p:cNvCxnSpPr/>
+          <p:nvPr/>
+        </p:nvCxnSpPr>
+        <p:spPr>
+          <a:xfrm flipV="1">
+            <a:off x="6738551" y="3240769"/>
+            <a:ext cx="0" cy="783411"/>
+          </a:xfrm>
+          <a:prstGeom prst="straightConnector1">
+            <a:avLst/>
+          </a:prstGeom>
+          <a:ln>
+            <a:solidFill>
+              <a:schemeClr val="tx1"/>
+            </a:solidFill>
+            <a:tailEnd type="triangle"/>
+          </a:ln>
+        </p:spPr>
+        <p:style>
+          <a:lnRef idx="1">
+            <a:schemeClr val="accent1"/>
+          </a:lnRef>
+          <a:fillRef idx="0">
+            <a:schemeClr val="accent1"/>
+          </a:fillRef>
+          <a:effectRef idx="0">
+            <a:schemeClr val="accent1"/>
+          </a:effectRef>
+          <a:fontRef idx="minor">
+            <a:schemeClr val="tx1"/>
+          </a:fontRef>
+        </p:style>
+      </p:cxnSp>
+      <p:cxnSp>
+        <p:nvCxnSpPr>
+          <p:cNvPr id="43" name="Straight Arrow Connector 42"/>
+          <p:cNvCxnSpPr/>
+          <p:nvPr/>
+        </p:nvCxnSpPr>
+        <p:spPr>
+          <a:xfrm>
+            <a:off x="7858897" y="3240769"/>
+            <a:ext cx="0" cy="783411"/>
+          </a:xfrm>
+          <a:prstGeom prst="straightConnector1">
+            <a:avLst/>
+          </a:prstGeom>
+          <a:ln>
+            <a:solidFill>
+              <a:schemeClr val="tx1"/>
+            </a:solidFill>
+            <a:tailEnd type="triangle"/>
+          </a:ln>
+        </p:spPr>
+        <p:style>
+          <a:lnRef idx="1">
+            <a:schemeClr val="accent1"/>
+          </a:lnRef>
+          <a:fillRef idx="0">
+            <a:schemeClr val="accent1"/>
+          </a:fillRef>
+          <a:effectRef idx="0">
+            <a:schemeClr val="accent1"/>
+          </a:effectRef>
+          <a:fontRef idx="minor">
+            <a:schemeClr val="tx1"/>
+          </a:fontRef>
+        </p:style>
+      </p:cxnSp>
+      <p:cxnSp>
+        <p:nvCxnSpPr>
+          <p:cNvPr id="46" name="Straight Arrow Connector 45"/>
+          <p:cNvCxnSpPr/>
+          <p:nvPr/>
+        </p:nvCxnSpPr>
+        <p:spPr>
+          <a:xfrm flipV="1">
+            <a:off x="2829505" y="2551739"/>
+            <a:ext cx="0" cy="225652"/>
+          </a:xfrm>
+          <a:prstGeom prst="straightConnector1">
+            <a:avLst/>
+          </a:prstGeom>
+          <a:ln>
+            <a:solidFill>
+              <a:schemeClr val="tx1"/>
+            </a:solidFill>
+            <a:tailEnd type="triangle"/>
+          </a:ln>
+        </p:spPr>
+        <p:style>
+          <a:lnRef idx="1">
+            <a:schemeClr val="accent1"/>
+          </a:lnRef>
+          <a:fillRef idx="0">
+            <a:schemeClr val="accent1"/>
+          </a:fillRef>
+          <a:effectRef idx="0">
+            <a:schemeClr val="accent1"/>
+          </a:effectRef>
+          <a:fontRef idx="minor">
+            <a:schemeClr val="tx1"/>
+          </a:fontRef>
+        </p:style>
+      </p:cxnSp>
+      <p:cxnSp>
+        <p:nvCxnSpPr>
+          <p:cNvPr id="47" name="Straight Arrow Connector 46"/>
+          <p:cNvCxnSpPr/>
+          <p:nvPr/>
+        </p:nvCxnSpPr>
+        <p:spPr>
+          <a:xfrm>
+            <a:off x="3579148" y="2551739"/>
+            <a:ext cx="0" cy="225652"/>
+          </a:xfrm>
+          <a:prstGeom prst="straightConnector1">
+            <a:avLst/>
+          </a:prstGeom>
+          <a:ln>
+            <a:solidFill>
+              <a:schemeClr val="tx1"/>
+            </a:solidFill>
+            <a:tailEnd type="triangle"/>
+          </a:ln>
+        </p:spPr>
+        <p:style>
+          <a:lnRef idx="1">
+            <a:schemeClr val="accent1"/>
+          </a:lnRef>
+          <a:fillRef idx="0">
+            <a:schemeClr val="accent1"/>
+          </a:fillRef>
+          <a:effectRef idx="0">
+            <a:schemeClr val="accent1"/>
+          </a:effectRef>
+          <a:fontRef idx="minor">
+            <a:schemeClr val="tx1"/>
+          </a:fontRef>
+        </p:style>
+      </p:cxnSp>
+      <p:cxnSp>
+        <p:nvCxnSpPr>
+          <p:cNvPr id="60" name="Straight Arrow Connector 59"/>
+          <p:cNvCxnSpPr/>
+          <p:nvPr/>
+        </p:nvCxnSpPr>
+        <p:spPr>
+          <a:xfrm flipV="1">
+            <a:off x="4872489" y="2551739"/>
+            <a:ext cx="0" cy="225652"/>
+          </a:xfrm>
+          <a:prstGeom prst="straightConnector1">
+            <a:avLst/>
+          </a:prstGeom>
+          <a:ln>
+            <a:solidFill>
+              <a:schemeClr val="tx1"/>
+            </a:solidFill>
+            <a:tailEnd type="triangle"/>
+          </a:ln>
+        </p:spPr>
+        <p:style>
+          <a:lnRef idx="1">
+            <a:schemeClr val="accent1"/>
+          </a:lnRef>
+          <a:fillRef idx="0">
+            <a:schemeClr val="accent1"/>
+          </a:fillRef>
+          <a:effectRef idx="0">
+            <a:schemeClr val="accent1"/>
+          </a:effectRef>
+          <a:fontRef idx="minor">
+            <a:schemeClr val="tx1"/>
+          </a:fontRef>
+        </p:style>
+      </p:cxnSp>
+      <p:cxnSp>
+        <p:nvCxnSpPr>
+          <p:cNvPr id="61" name="Straight Arrow Connector 60"/>
+          <p:cNvCxnSpPr/>
+          <p:nvPr/>
+        </p:nvCxnSpPr>
+        <p:spPr>
+          <a:xfrm>
+            <a:off x="5622132" y="2551739"/>
+            <a:ext cx="0" cy="225652"/>
+          </a:xfrm>
+          <a:prstGeom prst="straightConnector1">
+            <a:avLst/>
+          </a:prstGeom>
+          <a:ln>
+            <a:solidFill>
+              <a:schemeClr val="tx1"/>
+            </a:solidFill>
+            <a:tailEnd type="triangle"/>
+          </a:ln>
+        </p:spPr>
+        <p:style>
+          <a:lnRef idx="1">
+            <a:schemeClr val="accent1"/>
+          </a:lnRef>
+          <a:fillRef idx="0">
+            <a:schemeClr val="accent1"/>
+          </a:fillRef>
+          <a:effectRef idx="0">
+            <a:schemeClr val="accent1"/>
+          </a:effectRef>
+          <a:fontRef idx="minor">
+            <a:schemeClr val="tx1"/>
+          </a:fontRef>
+        </p:style>
+      </p:cxnSp>
+      <p:cxnSp>
+        <p:nvCxnSpPr>
+          <p:cNvPr id="62" name="Straight Arrow Connector 61"/>
+          <p:cNvCxnSpPr/>
+          <p:nvPr/>
+        </p:nvCxnSpPr>
+        <p:spPr>
+          <a:xfrm flipV="1">
+            <a:off x="6948424" y="2551739"/>
+            <a:ext cx="0" cy="225652"/>
+          </a:xfrm>
+          <a:prstGeom prst="straightConnector1">
+            <a:avLst/>
+          </a:prstGeom>
+          <a:ln>
+            <a:solidFill>
+              <a:schemeClr val="tx1"/>
+            </a:solidFill>
+            <a:tailEnd type="triangle"/>
+          </a:ln>
+        </p:spPr>
+        <p:style>
+          <a:lnRef idx="1">
+            <a:schemeClr val="accent1"/>
+          </a:lnRef>
+          <a:fillRef idx="0">
+            <a:schemeClr val="accent1"/>
+          </a:fillRef>
+          <a:effectRef idx="0">
+            <a:schemeClr val="accent1"/>
+          </a:effectRef>
+          <a:fontRef idx="minor">
+            <a:schemeClr val="tx1"/>
+          </a:fontRef>
+        </p:style>
+      </p:cxnSp>
+      <p:cxnSp>
+        <p:nvCxnSpPr>
+          <p:cNvPr id="63" name="Straight Arrow Connector 62"/>
+          <p:cNvCxnSpPr/>
+          <p:nvPr/>
+        </p:nvCxnSpPr>
+        <p:spPr>
+          <a:xfrm>
+            <a:off x="7698067" y="2551739"/>
+            <a:ext cx="0" cy="225652"/>
+          </a:xfrm>
+          <a:prstGeom prst="straightConnector1">
+            <a:avLst/>
+          </a:prstGeom>
+          <a:ln>
+            <a:solidFill>
+              <a:schemeClr val="tx1"/>
+            </a:solidFill>
+            <a:tailEnd type="triangle"/>
+          </a:ln>
+        </p:spPr>
+        <p:style>
+          <a:lnRef idx="1">
+            <a:schemeClr val="accent1"/>
+          </a:lnRef>
+          <a:fillRef idx="0">
+            <a:schemeClr val="accent1"/>
+          </a:fillRef>
+          <a:effectRef idx="0">
+            <a:schemeClr val="accent1"/>
+          </a:effectRef>
+          <a:fontRef idx="minor">
+            <a:schemeClr val="tx1"/>
+          </a:fontRef>
+        </p:style>
+      </p:cxnSp>
+      <p:sp>
+        <p:nvSpPr>
+          <p:cNvPr id="64" name="TextBox 63"/>
+          <p:cNvSpPr txBox="1"/>
+          <p:nvPr/>
+        </p:nvSpPr>
+        <p:spPr>
+          <a:xfrm rot="16200000">
+            <a:off x="7977955" y="2513175"/>
+            <a:ext cx="1176412" cy="369332"/>
+          </a:xfrm>
+          <a:prstGeom prst="rect">
+            <a:avLst/>
+          </a:prstGeom>
+          <a:noFill/>
+        </p:spPr>
+        <p:txBody>
+          <a:bodyPr wrap="none" rtlCol="0">
+            <a:spAutoFit/>
+          </a:bodyPr>
+          <a:lstStyle/>
+          <a:p>
+            <a:r>
+              <a:rPr lang="en-US" dirty="0" smtClean="0"/>
+              <a:t>Core Layer</a:t>
+            </a:r>
+            <a:endParaRPr lang="en-US" dirty="0"/>
+          </a:p>
+        </p:txBody>
+      </p:sp>
+      <p:sp>
+        <p:nvSpPr>
+          <p:cNvPr id="66" name="TextBox 65"/>
+          <p:cNvSpPr txBox="1"/>
+          <p:nvPr/>
+        </p:nvSpPr>
+        <p:spPr>
+          <a:xfrm>
+            <a:off x="7321923" y="4978394"/>
+            <a:ext cx="1478866" cy="369332"/>
+          </a:xfrm>
+          <a:prstGeom prst="rect">
+            <a:avLst/>
+          </a:prstGeom>
+          <a:noFill/>
+        </p:spPr>
+        <p:txBody>
+          <a:bodyPr wrap="none" rtlCol="0">
+            <a:spAutoFit/>
+          </a:bodyPr>
+          <a:lstStyle/>
+          <a:p>
+            <a:r>
+              <a:rPr lang="en-US" dirty="0" smtClean="0"/>
+              <a:t>Physical Layer</a:t>
+            </a:r>
+            <a:endParaRPr lang="en-US" dirty="0"/>
+          </a:p>
+        </p:txBody>
+      </p:sp>
+    </p:spTree>
+    <p:extLst>
+      <p:ext uri="{BB962C8B-B14F-4D97-AF65-F5344CB8AC3E}">
+        <p14:creationId xmlns:p14="http://schemas.microsoft.com/office/powerpoint/2010/main" val="625149797"/>
       </p:ext>
     </p:extLst>
   </p:cSld>

</xml_diff>